<commit_message>
Added show bounds and wireframe mode.
</commit_message>
<xml_diff>
--- a/teoria/j3dEngine_chapter2.pptx
+++ b/teoria/j3dEngine_chapter2.pptx
@@ -5,7 +5,7 @@
     <p:sldMasterId id="2147483696" r:id="rId1"/>
   </p:sldMasterIdLst>
   <p:notesMasterIdLst>
-    <p:notesMasterId r:id="rId20"/>
+    <p:notesMasterId r:id="rId21"/>
   </p:notesMasterIdLst>
   <p:sldIdLst>
     <p:sldId id="256" r:id="rId2"/>
@@ -26,6 +26,7 @@
     <p:sldId id="273" r:id="rId17"/>
     <p:sldId id="274" r:id="rId18"/>
     <p:sldId id="275" r:id="rId19"/>
+    <p:sldId id="276" r:id="rId20"/>
   </p:sldIdLst>
   <p:sldSz cx="9144000" cy="6858000" type="screen4x3"/>
   <p:notesSz cx="6858000" cy="9144000"/>
@@ -209,7 +210,8 @@
           <a:p>
             <a:fld id="{016812C2-A8AF-4744-8062-0CC3280E3ED1}" type="datetimeFigureOut">
               <a:rPr lang="en-US" smtClean="0"/>
-              <a:t>3/27/2007</a:t>
+              <a:pPr/>
+              <a:t>3/28/2007</a:t>
             </a:fld>
             <a:endParaRPr lang="en-US"/>
           </a:p>
@@ -370,6 +372,7 @@
           <a:p>
             <a:fld id="{D63B32DD-A893-4EA8-98D8-80D8D2C857A6}" type="slidenum">
               <a:rPr lang="en-US" smtClean="0"/>
+              <a:pPr/>
               <a:t>‹#›</a:t>
             </a:fld>
             <a:endParaRPr lang="en-US"/>
@@ -723,7 +726,7 @@
             <a:fld id="{3047E67A-D6CF-401E-8E00-3E8CFFC70C48}" type="datetimeFigureOut">
               <a:rPr lang="en-US" smtClean="0"/>
               <a:pPr/>
-              <a:t>3/27/2007</a:t>
+              <a:t>3/28/2007</a:t>
             </a:fld>
             <a:endParaRPr lang="en-US"/>
           </a:p>
@@ -948,7 +951,7 @@
             <a:fld id="{3047E67A-D6CF-401E-8E00-3E8CFFC70C48}" type="datetimeFigureOut">
               <a:rPr lang="en-US" smtClean="0"/>
               <a:pPr/>
-              <a:t>3/27/2007</a:t>
+              <a:t>3/28/2007</a:t>
             </a:fld>
             <a:endParaRPr lang="en-US"/>
           </a:p>
@@ -1230,7 +1233,7 @@
             <a:fld id="{3047E67A-D6CF-401E-8E00-3E8CFFC70C48}" type="datetimeFigureOut">
               <a:rPr lang="en-US" smtClean="0"/>
               <a:pPr/>
-              <a:t>3/27/2007</a:t>
+              <a:t>3/28/2007</a:t>
             </a:fld>
             <a:endParaRPr lang="en-US"/>
           </a:p>
@@ -1411,7 +1414,7 @@
             <a:fld id="{3047E67A-D6CF-401E-8E00-3E8CFFC70C48}" type="datetimeFigureOut">
               <a:rPr lang="en-US" smtClean="0"/>
               <a:pPr/>
-              <a:t>3/27/2007</a:t>
+              <a:t>3/28/2007</a:t>
             </a:fld>
             <a:endParaRPr lang="en-US"/>
           </a:p>
@@ -1771,7 +1774,7 @@
             <a:fld id="{3047E67A-D6CF-401E-8E00-3E8CFFC70C48}" type="datetimeFigureOut">
               <a:rPr lang="en-US" smtClean="0"/>
               <a:pPr/>
-              <a:t>3/27/2007</a:t>
+              <a:t>3/28/2007</a:t>
             </a:fld>
             <a:endParaRPr lang="en-US"/>
           </a:p>
@@ -2060,7 +2063,7 @@
             <a:fld id="{3047E67A-D6CF-401E-8E00-3E8CFFC70C48}" type="datetimeFigureOut">
               <a:rPr lang="en-US" smtClean="0"/>
               <a:pPr/>
-              <a:t>3/27/2007</a:t>
+              <a:t>3/28/2007</a:t>
             </a:fld>
             <a:endParaRPr lang="en-US"/>
           </a:p>
@@ -2484,7 +2487,7 @@
             <a:fld id="{3047E67A-D6CF-401E-8E00-3E8CFFC70C48}" type="datetimeFigureOut">
               <a:rPr lang="en-US" smtClean="0"/>
               <a:pPr/>
-              <a:t>3/27/2007</a:t>
+              <a:t>3/28/2007</a:t>
             </a:fld>
             <a:endParaRPr lang="en-US"/>
           </a:p>
@@ -2601,7 +2604,7 @@
             <a:fld id="{3047E67A-D6CF-401E-8E00-3E8CFFC70C48}" type="datetimeFigureOut">
               <a:rPr lang="en-US" smtClean="0"/>
               <a:pPr/>
-              <a:t>3/27/2007</a:t>
+              <a:t>3/28/2007</a:t>
             </a:fld>
             <a:endParaRPr lang="en-US"/>
           </a:p>
@@ -2693,7 +2696,7 @@
             <a:fld id="{3047E67A-D6CF-401E-8E00-3E8CFFC70C48}" type="datetimeFigureOut">
               <a:rPr lang="en-US" smtClean="0"/>
               <a:pPr/>
-              <a:t>3/27/2007</a:t>
+              <a:t>3/28/2007</a:t>
             </a:fld>
             <a:endParaRPr lang="en-US"/>
           </a:p>
@@ -2973,7 +2976,7 @@
             <a:fld id="{3047E67A-D6CF-401E-8E00-3E8CFFC70C48}" type="datetimeFigureOut">
               <a:rPr lang="en-US" smtClean="0"/>
               <a:pPr/>
-              <a:t>3/27/2007</a:t>
+              <a:t>3/28/2007</a:t>
             </a:fld>
             <a:endParaRPr lang="en-US"/>
           </a:p>
@@ -3341,7 +3344,7 @@
             <a:fld id="{3047E67A-D6CF-401E-8E00-3E8CFFC70C48}" type="datetimeFigureOut">
               <a:rPr lang="en-US" smtClean="0"/>
               <a:pPr/>
-              <a:t>3/27/2007</a:t>
+              <a:t>3/28/2007</a:t>
             </a:fld>
             <a:endParaRPr lang="en-US"/>
           </a:p>
@@ -3780,7 +3783,7 @@
             <a:fld id="{3047E67A-D6CF-401E-8E00-3E8CFFC70C48}" type="datetimeFigureOut">
               <a:rPr lang="en-US" smtClean="0"/>
               <a:pPr/>
-              <a:t>3/27/2007</a:t>
+              <a:t>3/28/2007</a:t>
             </a:fld>
             <a:endParaRPr lang="en-US"/>
           </a:p>
@@ -5339,11 +5342,7 @@
             </a:r>
             <a:r>
               <a:rPr lang="es-AR" dirty="0" err="1" smtClean="0"/>
-              <a:t>T</a:t>
-            </a:r>
-            <a:r>
-              <a:rPr lang="es-AR" dirty="0" err="1" smtClean="0"/>
-              <a:t>exturing</a:t>
+              <a:t>Texturing</a:t>
             </a:r>
             <a:r>
               <a:rPr lang="es-AR" dirty="0" smtClean="0"/>
@@ -5943,7 +5942,7 @@
           <a:p>
             <a:r>
               <a:rPr lang="es-AR" dirty="0" smtClean="0"/>
-              <a:t>Texturas</a:t>
+              <a:t>Texturas y Materiales</a:t>
             </a:r>
             <a:endParaRPr lang="en-US" dirty="0"/>
           </a:p>
@@ -5964,10 +5963,79 @@
           <a:bodyPr/>
           <a:lstStyle/>
           <a:p>
-            <a:endParaRPr lang="en-US"/>
-          </a:p>
-        </p:txBody>
-      </p:sp>
+            <a:r>
+              <a:rPr lang="es-AR" dirty="0" smtClean="0"/>
+              <a:t>Mapeo de Texturas</a:t>
+            </a:r>
+          </a:p>
+        </p:txBody>
+      </p:sp>
+      <p:pic>
+        <p:nvPicPr>
+          <p:cNvPr id="1026" name="Picture 2"/>
+          <p:cNvPicPr>
+            <a:picLocks noChangeAspect="1" noChangeArrowheads="1"/>
+          </p:cNvPicPr>
+          <p:nvPr/>
+        </p:nvPicPr>
+        <p:blipFill>
+          <a:blip r:embed="rId2"/>
+          <a:srcRect/>
+          <a:stretch>
+            <a:fillRect/>
+          </a:stretch>
+        </p:blipFill>
+        <p:spPr bwMode="auto">
+          <a:xfrm>
+            <a:off x="4929190" y="1785926"/>
+            <a:ext cx="3959225" cy="1970087"/>
+          </a:xfrm>
+          <a:prstGeom prst="rect">
+            <a:avLst/>
+          </a:prstGeom>
+          <a:noFill/>
+          <a:ln w="9525">
+            <a:noFill/>
+            <a:miter lim="800000"/>
+            <a:headEnd/>
+            <a:tailEnd/>
+          </a:ln>
+          <a:effectLst/>
+        </p:spPr>
+      </p:pic>
+      <p:pic>
+        <p:nvPicPr>
+          <p:cNvPr id="1027" name="Picture 3"/>
+          <p:cNvPicPr>
+            <a:picLocks noChangeAspect="1" noChangeArrowheads="1"/>
+          </p:cNvPicPr>
+          <p:nvPr/>
+        </p:nvPicPr>
+        <p:blipFill>
+          <a:blip r:embed="rId3"/>
+          <a:srcRect/>
+          <a:stretch>
+            <a:fillRect/>
+          </a:stretch>
+        </p:blipFill>
+        <p:spPr bwMode="auto">
+          <a:xfrm>
+            <a:off x="571472" y="2643182"/>
+            <a:ext cx="3892889" cy="3571900"/>
+          </a:xfrm>
+          <a:prstGeom prst="rect">
+            <a:avLst/>
+          </a:prstGeom>
+          <a:noFill/>
+          <a:ln w="9525">
+            <a:noFill/>
+            <a:miter lim="800000"/>
+            <a:headEnd/>
+            <a:tailEnd/>
+          </a:ln>
+          <a:effectLst/>
+        </p:spPr>
+      </p:pic>
     </p:spTree>
   </p:cSld>
   <p:clrMapOvr>
@@ -5980,6 +6048,73 @@
       </p:par>
     </p:tnLst>
   </p:timing>
+</p:sld>
+</file>
+
+<file path=ppt/slides/slide19.xml><?xml version="1.0" encoding="utf-8"?>
+<p:sld xmlns:a="http://schemas.openxmlformats.org/drawingml/2006/main" xmlns:r="http://schemas.openxmlformats.org/officeDocument/2006/relationships" xmlns:p="http://schemas.openxmlformats.org/presentationml/2006/main">
+  <p:cSld>
+    <p:spTree>
+      <p:nvGrpSpPr>
+        <p:cNvPr id="1" name=""/>
+        <p:cNvGrpSpPr/>
+        <p:nvPr/>
+      </p:nvGrpSpPr>
+      <p:grpSpPr>
+        <a:xfrm>
+          <a:off x="0" y="0"/>
+          <a:ext cx="0" cy="0"/>
+          <a:chOff x="0" y="0"/>
+          <a:chExt cx="0" cy="0"/>
+        </a:xfrm>
+      </p:grpSpPr>
+      <p:sp>
+        <p:nvSpPr>
+          <p:cNvPr id="2" name="Title 1"/>
+          <p:cNvSpPr>
+            <a:spLocks noGrp="1"/>
+          </p:cNvSpPr>
+          <p:nvPr>
+            <p:ph type="title"/>
+          </p:nvPr>
+        </p:nvSpPr>
+        <p:spPr/>
+        <p:txBody>
+          <a:bodyPr/>
+          <a:lstStyle/>
+          <a:p>
+            <a:r>
+              <a:rPr lang="es-AR" dirty="0" smtClean="0"/>
+              <a:t>Texturas y Materiales</a:t>
+            </a:r>
+            <a:endParaRPr lang="en-US" dirty="0"/>
+          </a:p>
+        </p:txBody>
+      </p:sp>
+      <p:sp>
+        <p:nvSpPr>
+          <p:cNvPr id="3" name="Content Placeholder 2"/>
+          <p:cNvSpPr>
+            <a:spLocks noGrp="1"/>
+          </p:cNvSpPr>
+          <p:nvPr>
+            <p:ph idx="1"/>
+          </p:nvPr>
+        </p:nvSpPr>
+        <p:spPr/>
+        <p:txBody>
+          <a:bodyPr/>
+          <a:lstStyle/>
+          <a:p>
+            <a:endParaRPr lang="en-US"/>
+          </a:p>
+        </p:txBody>
+      </p:sp>
+    </p:spTree>
+  </p:cSld>
+  <p:clrMapOvr>
+    <a:masterClrMapping/>
+  </p:clrMapOvr>
 </p:sld>
 </file>
 

</xml_diff>